<commit_message>
mejoras pdfs y codigo de conversores
</commit_message>
<xml_diff>
--- a/_18_JSF/powerpoint/JSF - 5 - Conversores y validadores.pptx
+++ b/_18_JSF/powerpoint/JSF - 5 - Conversores y validadores.pptx
@@ -350,7 +350,7 @@
           <a:p>
             <a:fld id="{7A847CFC-816F-41D0-AAC0-9BF4FEBC753E}" type="datetimeFigureOut">
               <a:rPr lang="es-ES" smtClean="0"/>
-              <a:t>18/10/2022</a:t>
+              <a:t>31/10/2022</a:t>
             </a:fld>
             <a:endParaRPr lang="es-ES"/>
           </a:p>
@@ -513,7 +513,7 @@
           <a:p>
             <a:fld id="{7A847CFC-816F-41D0-AAC0-9BF4FEBC753E}" type="datetimeFigureOut">
               <a:rPr lang="es-ES" smtClean="0"/>
-              <a:t>18/10/2022</a:t>
+              <a:t>31/10/2022</a:t>
             </a:fld>
             <a:endParaRPr lang="es-ES"/>
           </a:p>
@@ -686,7 +686,7 @@
           <a:p>
             <a:fld id="{7A847CFC-816F-41D0-AAC0-9BF4FEBC753E}" type="datetimeFigureOut">
               <a:rPr lang="es-ES" smtClean="0"/>
-              <a:t>18/10/2022</a:t>
+              <a:t>31/10/2022</a:t>
             </a:fld>
             <a:endParaRPr lang="es-ES"/>
           </a:p>
@@ -3120,7 +3120,7 @@
           <a:p>
             <a:fld id="{7A847CFC-816F-41D0-AAC0-9BF4FEBC753E}" type="datetimeFigureOut">
               <a:rPr lang="es-ES" smtClean="0"/>
-              <a:t>18/10/2022</a:t>
+              <a:t>31/10/2022</a:t>
             </a:fld>
             <a:endParaRPr lang="es-ES"/>
           </a:p>
@@ -5583,7 +5583,7 @@
           <a:p>
             <a:fld id="{7A847CFC-816F-41D0-AAC0-9BF4FEBC753E}" type="datetimeFigureOut">
               <a:rPr lang="es-ES" smtClean="0"/>
-              <a:t>18/10/2022</a:t>
+              <a:t>31/10/2022</a:t>
             </a:fld>
             <a:endParaRPr lang="es-ES"/>
           </a:p>
@@ -6038,7 +6038,7 @@
           <a:p>
             <a:fld id="{7A847CFC-816F-41D0-AAC0-9BF4FEBC753E}" type="datetimeFigureOut">
               <a:rPr lang="es-ES" smtClean="0"/>
-              <a:t>18/10/2022</a:t>
+              <a:t>31/10/2022</a:t>
             </a:fld>
             <a:endParaRPr lang="es-ES"/>
           </a:p>
@@ -7596,7 +7596,7 @@
           <a:p>
             <a:fld id="{7A847CFC-816F-41D0-AAC0-9BF4FEBC753E}" type="datetimeFigureOut">
               <a:rPr lang="es-ES" smtClean="0"/>
-              <a:t>18/10/2022</a:t>
+              <a:t>31/10/2022</a:t>
             </a:fld>
             <a:endParaRPr lang="es-ES"/>
           </a:p>
@@ -8010,7 +8010,7 @@
           <a:p>
             <a:fld id="{7A847CFC-816F-41D0-AAC0-9BF4FEBC753E}" type="datetimeFigureOut">
               <a:rPr lang="es-ES" smtClean="0"/>
-              <a:t>18/10/2022</a:t>
+              <a:t>31/10/2022</a:t>
             </a:fld>
             <a:endParaRPr lang="es-ES"/>
           </a:p>
@@ -8122,7 +8122,7 @@
           <a:p>
             <a:fld id="{7A847CFC-816F-41D0-AAC0-9BF4FEBC753E}" type="datetimeFigureOut">
               <a:rPr lang="es-ES" smtClean="0"/>
-              <a:t>18/10/2022</a:t>
+              <a:t>31/10/2022</a:t>
             </a:fld>
             <a:endParaRPr lang="es-ES"/>
           </a:p>
@@ -8212,7 +8212,7 @@
           <a:p>
             <a:fld id="{7A847CFC-816F-41D0-AAC0-9BF4FEBC753E}" type="datetimeFigureOut">
               <a:rPr lang="es-ES" smtClean="0"/>
-              <a:t>18/10/2022</a:t>
+              <a:t>31/10/2022</a:t>
             </a:fld>
             <a:endParaRPr lang="es-ES"/>
           </a:p>
@@ -8482,7 +8482,7 @@
           <a:p>
             <a:fld id="{7A847CFC-816F-41D0-AAC0-9BF4FEBC753E}" type="datetimeFigureOut">
               <a:rPr lang="es-ES" smtClean="0"/>
-              <a:t>18/10/2022</a:t>
+              <a:t>31/10/2022</a:t>
             </a:fld>
             <a:endParaRPr lang="es-ES"/>
           </a:p>
@@ -8729,7 +8729,7 @@
           <a:p>
             <a:fld id="{7A847CFC-816F-41D0-AAC0-9BF4FEBC753E}" type="datetimeFigureOut">
               <a:rPr lang="es-ES" smtClean="0"/>
-              <a:t>18/10/2022</a:t>
+              <a:t>31/10/2022</a:t>
             </a:fld>
             <a:endParaRPr lang="es-ES"/>
           </a:p>
@@ -8935,7 +8935,7 @@
           <a:p>
             <a:fld id="{7A847CFC-816F-41D0-AAC0-9BF4FEBC753E}" type="datetimeFigureOut">
               <a:rPr lang="es-ES" smtClean="0"/>
-              <a:t>18/10/2022</a:t>
+              <a:t>31/10/2022</a:t>
             </a:fld>
             <a:endParaRPr lang="es-ES"/>
           </a:p>
@@ -9530,7 +9530,7 @@
           <a:p>
             <a:fld id="{7A847CFC-816F-41D0-AAC0-9BF4FEBC753E}" type="datetimeFigureOut">
               <a:rPr lang="es-ES" smtClean="0"/>
-              <a:t>18/10/2022</a:t>
+              <a:t>31/10/2022</a:t>
             </a:fld>
             <a:endParaRPr lang="es-ES"/>
           </a:p>
@@ -10136,7 +10136,7 @@
           <a:p>
             <a:fld id="{7A847CFC-816F-41D0-AAC0-9BF4FEBC753E}" type="datetimeFigureOut">
               <a:rPr lang="es-ES" smtClean="0"/>
-              <a:t>18/10/2022</a:t>
+              <a:t>31/10/2022</a:t>
             </a:fld>
             <a:endParaRPr lang="es-ES"/>
           </a:p>
@@ -16229,7 +16229,7 @@
           <a:p>
             <a:r>
               <a:rPr lang="es-ES" dirty="0"/>
-              <a:t>Se pueden aplicar convertidores a las siguientes etiquetas</a:t>
+              <a:t>Se pueden aplicar conversores a las siguientes etiquetas</a:t>
             </a:r>
           </a:p>
           <a:p>
@@ -17215,8 +17215,8 @@
         </p:nvSpPr>
         <p:spPr>
           <a:xfrm>
-            <a:off x="1205063" y="2636912"/>
-            <a:ext cx="6733873" cy="1103667"/>
+            <a:off x="323528" y="2636912"/>
+            <a:ext cx="8363271" cy="849746"/>
           </a:xfrm>
           <a:prstGeom prst="rect">
             <a:avLst/>
@@ -17304,6 +17304,78 @@
               </a:rPr>
               <a:t>}" </a:t>
             </a:r>
+            <a:r>
+              <a:rPr lang="en-US" altLang="es-ES" sz="1700" dirty="0" err="1">
+                <a:solidFill>
+                  <a:srgbClr val="000000"/>
+                </a:solidFill>
+                <a:latin typeface="Gill Sans" charset="0"/>
+                <a:ea typeface="Gill Sans" charset="0"/>
+                <a:cs typeface="Gill Sans" charset="0"/>
+                <a:sym typeface="Gill Sans" charset="0"/>
+              </a:rPr>
+              <a:t>converterMessage</a:t>
+            </a:r>
+            <a:r>
+              <a:rPr lang="en-US" altLang="es-ES" sz="1700" dirty="0">
+                <a:solidFill>
+                  <a:srgbClr val="000000"/>
+                </a:solidFill>
+                <a:latin typeface="Gill Sans" charset="0"/>
+                <a:ea typeface="Gill Sans" charset="0"/>
+                <a:cs typeface="Gill Sans" charset="0"/>
+                <a:sym typeface="Gill Sans" charset="0"/>
+              </a:rPr>
+              <a:t>=“</a:t>
+            </a:r>
+            <a:r>
+              <a:rPr lang="en-US" altLang="es-ES" sz="1700" dirty="0" err="1">
+                <a:solidFill>
+                  <a:srgbClr val="000000"/>
+                </a:solidFill>
+                <a:latin typeface="Gill Sans" charset="0"/>
+                <a:ea typeface="Gill Sans" charset="0"/>
+                <a:cs typeface="Gill Sans" charset="0"/>
+                <a:sym typeface="Gill Sans" charset="0"/>
+              </a:rPr>
+              <a:t>Entero</a:t>
+            </a:r>
+            <a:r>
+              <a:rPr lang="en-US" altLang="es-ES" sz="1700" dirty="0">
+                <a:solidFill>
+                  <a:srgbClr val="000000"/>
+                </a:solidFill>
+                <a:latin typeface="Gill Sans" charset="0"/>
+                <a:ea typeface="Gill Sans" charset="0"/>
+                <a:cs typeface="Gill Sans" charset="0"/>
+                <a:sym typeface="Gill Sans" charset="0"/>
+              </a:rPr>
+              <a:t> </a:t>
+            </a:r>
+            <a:r>
+              <a:rPr lang="en-US" altLang="es-ES" sz="1700" dirty="0" err="1">
+                <a:solidFill>
+                  <a:srgbClr val="000000"/>
+                </a:solidFill>
+                <a:latin typeface="Gill Sans" charset="0"/>
+                <a:ea typeface="Gill Sans" charset="0"/>
+                <a:cs typeface="Gill Sans" charset="0"/>
+                <a:sym typeface="Gill Sans" charset="0"/>
+              </a:rPr>
+              <a:t>por</a:t>
+            </a:r>
+            <a:r>
+              <a:rPr lang="en-US" altLang="es-ES" sz="1700" dirty="0">
+                <a:solidFill>
+                  <a:srgbClr val="000000"/>
+                </a:solidFill>
+                <a:latin typeface="Gill Sans" charset="0"/>
+                <a:ea typeface="Gill Sans" charset="0"/>
+                <a:cs typeface="Gill Sans" charset="0"/>
+                <a:sym typeface="Gill Sans" charset="0"/>
+              </a:rPr>
+              <a:t> favor!"&gt; 	</a:t>
+            </a:r>
           </a:p>
           <a:p>
             <a:pPr defTabSz="410730" fontAlgn="base" hangingPunct="0">
@@ -17324,79 +17396,7 @@
                 <a:cs typeface="Gill Sans" charset="0"/>
                 <a:sym typeface="Gill Sans" charset="0"/>
               </a:rPr>
-              <a:t>		</a:t>
-            </a:r>
-            <a:r>
-              <a:rPr lang="en-US" altLang="es-ES" sz="1700" dirty="0" err="1">
-                <a:solidFill>
-                  <a:srgbClr val="000000"/>
-                </a:solidFill>
-                <a:latin typeface="Gill Sans" charset="0"/>
-                <a:ea typeface="Gill Sans" charset="0"/>
-                <a:cs typeface="Gill Sans" charset="0"/>
-                <a:sym typeface="Gill Sans" charset="0"/>
-              </a:rPr>
-              <a:t>converterMessage</a:t>
-            </a:r>
-            <a:r>
-              <a:rPr lang="en-US" altLang="es-ES" sz="1700" dirty="0">
-                <a:solidFill>
-                  <a:srgbClr val="000000"/>
-                </a:solidFill>
-                <a:latin typeface="Gill Sans" charset="0"/>
-                <a:ea typeface="Gill Sans" charset="0"/>
-                <a:cs typeface="Gill Sans" charset="0"/>
-                <a:sym typeface="Gill Sans" charset="0"/>
-              </a:rPr>
-              <a:t>="Un </a:t>
-            </a:r>
-            <a:r>
-              <a:rPr lang="en-US" altLang="es-ES" sz="1700" dirty="0" err="1">
-                <a:solidFill>
-                  <a:srgbClr val="000000"/>
-                </a:solidFill>
-                <a:latin typeface="Gill Sans" charset="0"/>
-                <a:ea typeface="Gill Sans" charset="0"/>
-                <a:cs typeface="Gill Sans" charset="0"/>
-                <a:sym typeface="Gill Sans" charset="0"/>
-              </a:rPr>
-              <a:t>entero</a:t>
-            </a:r>
-            <a:r>
-              <a:rPr lang="en-US" altLang="es-ES" sz="1700" dirty="0">
-                <a:solidFill>
-                  <a:srgbClr val="000000"/>
-                </a:solidFill>
-                <a:latin typeface="Gill Sans" charset="0"/>
-                <a:ea typeface="Gill Sans" charset="0"/>
-                <a:cs typeface="Gill Sans" charset="0"/>
-                <a:sym typeface="Gill Sans" charset="0"/>
-              </a:rPr>
-              <a:t> </a:t>
-            </a:r>
-            <a:r>
-              <a:rPr lang="en-US" altLang="es-ES" sz="1700" dirty="0" err="1">
-                <a:solidFill>
-                  <a:srgbClr val="000000"/>
-                </a:solidFill>
-                <a:latin typeface="Gill Sans" charset="0"/>
-                <a:ea typeface="Gill Sans" charset="0"/>
-                <a:cs typeface="Gill Sans" charset="0"/>
-                <a:sym typeface="Gill Sans" charset="0"/>
-              </a:rPr>
-              <a:t>por</a:t>
-            </a:r>
-            <a:r>
-              <a:rPr lang="en-US" altLang="es-ES" sz="1700" dirty="0">
-                <a:solidFill>
-                  <a:srgbClr val="000000"/>
-                </a:solidFill>
-                <a:latin typeface="Gill Sans" charset="0"/>
-                <a:ea typeface="Gill Sans" charset="0"/>
-                <a:cs typeface="Gill Sans" charset="0"/>
-                <a:sym typeface="Gill Sans" charset="0"/>
-              </a:rPr>
-              <a:t> favor!"&gt; 	&lt;</a:t>
+              <a:t>	&lt;</a:t>
             </a:r>
             <a:r>
               <a:rPr lang="en-US" altLang="es-ES" sz="1700" dirty="0" err="1">

</xml_diff>